<commit_message>
final ERD and schema
</commit_message>
<xml_diff>
--- a/EmployeeSQL/ERD_Diagram.pptx
+++ b/EmployeeSQL/ERD_Diagram.pptx
@@ -104,6 +104,11 @@
       </a:defRPr>
     </a:lvl9pPr>
   </p:defaultTextStyle>
+  <p:extLst>
+    <p:ext uri="{EFAFB233-063F-42B5-8137-9DF3F51BA10A}">
+      <p15:sldGuideLst xmlns:p15="http://schemas.microsoft.com/office/powerpoint/2012/main"/>
+    </p:ext>
+  </p:extLst>
 </p:presentation>
 </file>
 
@@ -254,7 +259,7 @@
           <a:p>
             <a:fld id="{15072844-A801-4322-AA28-814C2628B02E}" type="datetimeFigureOut">
               <a:rPr lang="en-US" smtClean="0"/>
-              <a:t>2/26/2021</a:t>
+              <a:t>2/27/2021</a:t>
             </a:fld>
             <a:endParaRPr lang="en-US"/>
           </a:p>
@@ -452,7 +457,7 @@
           <a:p>
             <a:fld id="{15072844-A801-4322-AA28-814C2628B02E}" type="datetimeFigureOut">
               <a:rPr lang="en-US" smtClean="0"/>
-              <a:t>2/26/2021</a:t>
+              <a:t>2/27/2021</a:t>
             </a:fld>
             <a:endParaRPr lang="en-US"/>
           </a:p>
@@ -660,7 +665,7 @@
           <a:p>
             <a:fld id="{15072844-A801-4322-AA28-814C2628B02E}" type="datetimeFigureOut">
               <a:rPr lang="en-US" smtClean="0"/>
-              <a:t>2/26/2021</a:t>
+              <a:t>2/27/2021</a:t>
             </a:fld>
             <a:endParaRPr lang="en-US"/>
           </a:p>
@@ -858,7 +863,7 @@
           <a:p>
             <a:fld id="{15072844-A801-4322-AA28-814C2628B02E}" type="datetimeFigureOut">
               <a:rPr lang="en-US" smtClean="0"/>
-              <a:t>2/26/2021</a:t>
+              <a:t>2/27/2021</a:t>
             </a:fld>
             <a:endParaRPr lang="en-US"/>
           </a:p>
@@ -1133,7 +1138,7 @@
           <a:p>
             <a:fld id="{15072844-A801-4322-AA28-814C2628B02E}" type="datetimeFigureOut">
               <a:rPr lang="en-US" smtClean="0"/>
-              <a:t>2/26/2021</a:t>
+              <a:t>2/27/2021</a:t>
             </a:fld>
             <a:endParaRPr lang="en-US"/>
           </a:p>
@@ -1398,7 +1403,7 @@
           <a:p>
             <a:fld id="{15072844-A801-4322-AA28-814C2628B02E}" type="datetimeFigureOut">
               <a:rPr lang="en-US" smtClean="0"/>
-              <a:t>2/26/2021</a:t>
+              <a:t>2/27/2021</a:t>
             </a:fld>
             <a:endParaRPr lang="en-US"/>
           </a:p>
@@ -1810,7 +1815,7 @@
           <a:p>
             <a:fld id="{15072844-A801-4322-AA28-814C2628B02E}" type="datetimeFigureOut">
               <a:rPr lang="en-US" smtClean="0"/>
-              <a:t>2/26/2021</a:t>
+              <a:t>2/27/2021</a:t>
             </a:fld>
             <a:endParaRPr lang="en-US"/>
           </a:p>
@@ -1951,7 +1956,7 @@
           <a:p>
             <a:fld id="{15072844-A801-4322-AA28-814C2628B02E}" type="datetimeFigureOut">
               <a:rPr lang="en-US" smtClean="0"/>
-              <a:t>2/26/2021</a:t>
+              <a:t>2/27/2021</a:t>
             </a:fld>
             <a:endParaRPr lang="en-US"/>
           </a:p>
@@ -2064,7 +2069,7 @@
           <a:p>
             <a:fld id="{15072844-A801-4322-AA28-814C2628B02E}" type="datetimeFigureOut">
               <a:rPr lang="en-US" smtClean="0"/>
-              <a:t>2/26/2021</a:t>
+              <a:t>2/27/2021</a:t>
             </a:fld>
             <a:endParaRPr lang="en-US"/>
           </a:p>
@@ -2375,7 +2380,7 @@
           <a:p>
             <a:fld id="{15072844-A801-4322-AA28-814C2628B02E}" type="datetimeFigureOut">
               <a:rPr lang="en-US" smtClean="0"/>
-              <a:t>2/26/2021</a:t>
+              <a:t>2/27/2021</a:t>
             </a:fld>
             <a:endParaRPr lang="en-US"/>
           </a:p>
@@ -2663,7 +2668,7 @@
           <a:p>
             <a:fld id="{15072844-A801-4322-AA28-814C2628B02E}" type="datetimeFigureOut">
               <a:rPr lang="en-US" smtClean="0"/>
-              <a:t>2/26/2021</a:t>
+              <a:t>2/27/2021</a:t>
             </a:fld>
             <a:endParaRPr lang="en-US"/>
           </a:p>
@@ -2904,7 +2909,7 @@
           <a:p>
             <a:fld id="{15072844-A801-4322-AA28-814C2628B02E}" type="datetimeFigureOut">
               <a:rPr lang="en-US" smtClean="0"/>
-              <a:t>2/26/2021</a:t>
+              <a:t>2/27/2021</a:t>
             </a:fld>
             <a:endParaRPr lang="en-US"/>
           </a:p>
@@ -3335,10 +3340,10 @@
         </p:nvGrpSpPr>
         <p:grpSpPr>
           <a:xfrm>
-            <a:off x="1083304" y="790541"/>
-            <a:ext cx="2178035" cy="1063546"/>
+            <a:off x="1083304" y="259637"/>
+            <a:ext cx="2283120" cy="1092610"/>
             <a:chOff x="1276349" y="790575"/>
-            <a:chExt cx="1762126" cy="1063546"/>
+            <a:chExt cx="1762126" cy="1092610"/>
           </a:xfrm>
         </p:grpSpPr>
         <p:sp>
@@ -3445,7 +3450,7 @@
           </p:nvSpPr>
           <p:spPr>
             <a:xfrm>
-              <a:off x="1276349" y="1484789"/>
+              <a:off x="1276349" y="1513853"/>
               <a:ext cx="1762125" cy="369332"/>
             </a:xfrm>
             <a:prstGeom prst="rect">
@@ -3490,8 +3495,8 @@
         </p:nvGrpSpPr>
         <p:grpSpPr>
           <a:xfrm>
-            <a:off x="1083305" y="4412094"/>
-            <a:ext cx="2178012" cy="1063546"/>
+            <a:off x="4562351" y="1657268"/>
+            <a:ext cx="2283120" cy="1063546"/>
             <a:chOff x="1276349" y="790575"/>
             <a:chExt cx="1762126" cy="1063546"/>
           </a:xfrm>
@@ -3538,7 +3543,7 @@
                     <a:schemeClr val="bg1"/>
                   </a:solidFill>
                 </a:rPr>
-                <a:t>TB3: </a:t>
+                <a:t>TB4: </a:t>
               </a:r>
               <a:r>
                 <a:rPr lang="en-US" b="1" dirty="0" err="1">
@@ -3593,8 +3598,12 @@
             <a:p>
               <a:pPr algn="ctr"/>
               <a:r>
+                <a:rPr lang="en-US" dirty="0" err="1"/>
+                <a:t>fk</a:t>
+              </a:r>
+              <a:r>
                 <a:rPr lang="en-US" dirty="0"/>
-                <a:t>pk: </a:t>
+                <a:t>: </a:t>
               </a:r>
               <a:r>
                 <a:rPr lang="en-US" dirty="0" err="1"/>
@@ -3666,7 +3675,7 @@
         </p:nvGrpSpPr>
         <p:grpSpPr>
           <a:xfrm>
-            <a:off x="5926134" y="373326"/>
+            <a:off x="1083304" y="1657268"/>
             <a:ext cx="2283145" cy="1063546"/>
             <a:chOff x="1276349" y="790575"/>
             <a:chExt cx="1762126" cy="1063546"/>
@@ -3714,7 +3723,7 @@
                     <a:schemeClr val="bg1"/>
                   </a:solidFill>
                 </a:rPr>
-                <a:t>TB4: titles</a:t>
+                <a:t>TB2: titles</a:t>
               </a:r>
             </a:p>
           </p:txBody>
@@ -3813,10 +3822,10 @@
       </p:grpSp>
       <p:grpSp>
         <p:nvGrpSpPr>
-          <p:cNvPr id="27" name="Group 26">
-            <a:extLst>
-              <a:ext uri="{FF2B5EF4-FFF2-40B4-BE49-F238E27FC236}">
-                <a16:creationId xmlns:a16="http://schemas.microsoft.com/office/drawing/2014/main" id="{AF4A9FC1-71F4-44BC-88BE-2161FE3F9301}"/>
+          <p:cNvPr id="20" name="Group 19">
+            <a:extLst>
+              <a:ext uri="{FF2B5EF4-FFF2-40B4-BE49-F238E27FC236}">
+                <a16:creationId xmlns:a16="http://schemas.microsoft.com/office/drawing/2014/main" id="{79B4287F-994B-485F-B2BE-21647C345614}"/>
               </a:ext>
             </a:extLst>
           </p:cNvPr>
@@ -3825,10 +3834,10 @@
         </p:nvGrpSpPr>
         <p:grpSpPr>
           <a:xfrm>
-            <a:off x="1083306" y="2415044"/>
-            <a:ext cx="2178014" cy="1454407"/>
-            <a:chOff x="1276345" y="3399136"/>
-            <a:chExt cx="1762127" cy="1454407"/>
+            <a:off x="7534483" y="1654907"/>
+            <a:ext cx="2178012" cy="1065907"/>
+            <a:chOff x="2417154" y="5084255"/>
+            <a:chExt cx="2178012" cy="1065907"/>
           </a:xfrm>
         </p:grpSpPr>
         <p:sp>
@@ -3845,8 +3854,8 @@
           </p:nvSpPr>
           <p:spPr>
             <a:xfrm>
-              <a:off x="1276345" y="3399136"/>
-              <a:ext cx="1762125" cy="646331"/>
+              <a:off x="2417154" y="5084255"/>
+              <a:ext cx="2178012" cy="369332"/>
             </a:xfrm>
             <a:prstGeom prst="rect">
               <a:avLst/>
@@ -3873,7 +3882,7 @@
                     <a:schemeClr val="bg1"/>
                   </a:solidFill>
                 </a:rPr>
-                <a:t>TB2: </a:t>
+                <a:t>TB5: </a:t>
               </a:r>
               <a:r>
                 <a:rPr lang="en-US" b="1" dirty="0" err="1">
@@ -3891,155 +3900,133 @@
             </a:p>
           </p:txBody>
         </p:sp>
-        <p:sp>
-          <p:nvSpPr>
-            <p:cNvPr id="14" name="TextBox 13">
+        <p:grpSp>
+          <p:nvGrpSpPr>
+            <p:cNvPr id="12" name="Group 11">
               <a:extLst>
                 <a:ext uri="{FF2B5EF4-FFF2-40B4-BE49-F238E27FC236}">
-                  <a16:creationId xmlns:a16="http://schemas.microsoft.com/office/drawing/2014/main" id="{B8E26437-2D4E-4987-A891-D9E37A7BFB9D}"/>
+                  <a16:creationId xmlns:a16="http://schemas.microsoft.com/office/drawing/2014/main" id="{E2C9D225-E729-46CD-BE06-A53287E352EA}"/>
                 </a:ext>
               </a:extLst>
             </p:cNvPr>
-            <p:cNvSpPr txBox="1"/>
+            <p:cNvGrpSpPr/>
             <p:nvPr/>
-          </p:nvSpPr>
-          <p:spPr>
+          </p:nvGrpSpPr>
+          <p:grpSpPr>
             <a:xfrm>
-              <a:off x="1276346" y="4484211"/>
-              <a:ext cx="1762125" cy="369332"/>
+              <a:off x="2417154" y="5455826"/>
+              <a:ext cx="2178012" cy="694336"/>
+              <a:chOff x="2417153" y="5453465"/>
+              <a:chExt cx="2178012" cy="694336"/>
             </a:xfrm>
-            <a:prstGeom prst="rect">
-              <a:avLst/>
-            </a:prstGeom>
-            <a:solidFill>
-              <a:schemeClr val="bg1"/>
-            </a:solidFill>
-            <a:ln>
+          </p:grpSpPr>
+          <p:sp>
+            <p:nvSpPr>
+              <p:cNvPr id="14" name="TextBox 13">
+                <a:extLst>
+                  <a:ext uri="{FF2B5EF4-FFF2-40B4-BE49-F238E27FC236}">
+                    <a16:creationId xmlns:a16="http://schemas.microsoft.com/office/drawing/2014/main" id="{B8E26437-2D4E-4987-A891-D9E37A7BFB9D}"/>
+                  </a:ext>
+                </a:extLst>
+              </p:cNvPr>
+              <p:cNvSpPr txBox="1"/>
+              <p:nvPr/>
+            </p:nvSpPr>
+            <p:spPr>
+              <a:xfrm>
+                <a:off x="2417153" y="5778469"/>
+                <a:ext cx="2178012" cy="369332"/>
+              </a:xfrm>
+              <a:prstGeom prst="rect">
+                <a:avLst/>
+              </a:prstGeom>
               <a:solidFill>
-                <a:schemeClr val="tx1"/>
+                <a:schemeClr val="bg1"/>
               </a:solidFill>
-            </a:ln>
-          </p:spPr>
-          <p:txBody>
-            <a:bodyPr wrap="square" rtlCol="0">
-              <a:spAutoFit/>
-            </a:bodyPr>
-            <a:lstStyle/>
-            <a:p>
-              <a:pPr algn="ctr"/>
-              <a:r>
-                <a:rPr lang="en-US" dirty="0" err="1"/>
-                <a:t>fk</a:t>
-              </a:r>
-              <a:r>
-                <a:rPr lang="en-US" dirty="0"/>
-                <a:t>: </a:t>
-              </a:r>
-              <a:r>
-                <a:rPr lang="en-US" dirty="0" err="1"/>
-                <a:t>emp_no</a:t>
-              </a:r>
-              <a:endParaRPr lang="en-US" dirty="0"/>
-            </a:p>
-          </p:txBody>
-        </p:sp>
-        <p:sp>
-          <p:nvSpPr>
-            <p:cNvPr id="15" name="TextBox 14">
-              <a:extLst>
-                <a:ext uri="{FF2B5EF4-FFF2-40B4-BE49-F238E27FC236}">
-                  <a16:creationId xmlns:a16="http://schemas.microsoft.com/office/drawing/2014/main" id="{F014303F-2507-4AEF-BE8F-2E0D389BAC72}"/>
-                </a:ext>
-              </a:extLst>
-            </p:cNvPr>
-            <p:cNvSpPr txBox="1"/>
-            <p:nvPr/>
-          </p:nvSpPr>
-          <p:spPr>
-            <a:xfrm>
-              <a:off x="1276347" y="4123214"/>
-              <a:ext cx="1762125" cy="369332"/>
-            </a:xfrm>
-            <a:prstGeom prst="rect">
-              <a:avLst/>
-            </a:prstGeom>
-            <a:solidFill>
-              <a:schemeClr val="bg1"/>
-            </a:solidFill>
-            <a:ln>
+              <a:ln>
+                <a:solidFill>
+                  <a:schemeClr val="tx1"/>
+                </a:solidFill>
+              </a:ln>
+            </p:spPr>
+            <p:txBody>
+              <a:bodyPr wrap="square" rtlCol="0">
+                <a:spAutoFit/>
+              </a:bodyPr>
+              <a:lstStyle/>
+              <a:p>
+                <a:pPr algn="ctr"/>
+                <a:r>
+                  <a:rPr lang="en-US" dirty="0" err="1"/>
+                  <a:t>fk</a:t>
+                </a:r>
+                <a:r>
+                  <a:rPr lang="en-US" dirty="0"/>
+                  <a:t>: </a:t>
+                </a:r>
+                <a:r>
+                  <a:rPr lang="en-US" dirty="0" err="1"/>
+                  <a:t>emp_no</a:t>
+                </a:r>
+                <a:endParaRPr lang="en-US" dirty="0"/>
+              </a:p>
+            </p:txBody>
+          </p:sp>
+          <p:sp>
+            <p:nvSpPr>
+              <p:cNvPr id="15" name="TextBox 14">
+                <a:extLst>
+                  <a:ext uri="{FF2B5EF4-FFF2-40B4-BE49-F238E27FC236}">
+                    <a16:creationId xmlns:a16="http://schemas.microsoft.com/office/drawing/2014/main" id="{F014303F-2507-4AEF-BE8F-2E0D389BAC72}"/>
+                  </a:ext>
+                </a:extLst>
+              </p:cNvPr>
+              <p:cNvSpPr txBox="1"/>
+              <p:nvPr/>
+            </p:nvSpPr>
+            <p:spPr>
+              <a:xfrm>
+                <a:off x="2417153" y="5453465"/>
+                <a:ext cx="2178012" cy="369332"/>
+              </a:xfrm>
+              <a:prstGeom prst="rect">
+                <a:avLst/>
+              </a:prstGeom>
               <a:solidFill>
-                <a:schemeClr val="tx1"/>
+                <a:schemeClr val="bg1"/>
               </a:solidFill>
-            </a:ln>
-          </p:spPr>
-          <p:txBody>
-            <a:bodyPr wrap="square" rtlCol="0">
-              <a:spAutoFit/>
-            </a:bodyPr>
-            <a:lstStyle/>
-            <a:p>
-              <a:pPr algn="ctr"/>
-              <a:r>
-                <a:rPr lang="en-US" dirty="0" err="1"/>
-                <a:t>fk</a:t>
-              </a:r>
-              <a:r>
-                <a:rPr lang="en-US" dirty="0"/>
-                <a:t>: dept_no</a:t>
-              </a:r>
-            </a:p>
-          </p:txBody>
-        </p:sp>
-        <p:sp>
-          <p:nvSpPr>
-            <p:cNvPr id="26" name="TextBox 25">
-              <a:extLst>
-                <a:ext uri="{FF2B5EF4-FFF2-40B4-BE49-F238E27FC236}">
-                  <a16:creationId xmlns:a16="http://schemas.microsoft.com/office/drawing/2014/main" id="{C316A7ED-F851-49B4-A348-99CDE6B536CC}"/>
-                </a:ext>
-              </a:extLst>
-            </p:cNvPr>
-            <p:cNvSpPr txBox="1"/>
-            <p:nvPr/>
-          </p:nvSpPr>
-          <p:spPr>
-            <a:xfrm>
-              <a:off x="1276346" y="3798332"/>
-              <a:ext cx="1762125" cy="369332"/>
-            </a:xfrm>
-            <a:prstGeom prst="rect">
-              <a:avLst/>
-            </a:prstGeom>
-            <a:solidFill>
-              <a:schemeClr val="bg1"/>
-            </a:solidFill>
-            <a:ln>
-              <a:solidFill>
-                <a:schemeClr val="tx1"/>
-              </a:solidFill>
-            </a:ln>
-          </p:spPr>
-          <p:txBody>
-            <a:bodyPr wrap="square" rtlCol="0">
-              <a:spAutoFit/>
-            </a:bodyPr>
-            <a:lstStyle/>
-            <a:p>
-              <a:pPr algn="ctr"/>
-              <a:r>
-                <a:rPr lang="en-US" dirty="0"/>
-                <a:t>pk: id</a:t>
-              </a:r>
-            </a:p>
-          </p:txBody>
-        </p:sp>
+              <a:ln>
+                <a:solidFill>
+                  <a:schemeClr val="tx1"/>
+                </a:solidFill>
+              </a:ln>
+            </p:spPr>
+            <p:txBody>
+              <a:bodyPr wrap="square" rtlCol="0">
+                <a:spAutoFit/>
+              </a:bodyPr>
+              <a:lstStyle/>
+              <a:p>
+                <a:pPr algn="ctr"/>
+                <a:r>
+                  <a:rPr lang="en-US" dirty="0" err="1"/>
+                  <a:t>fk</a:t>
+                </a:r>
+                <a:r>
+                  <a:rPr lang="en-US" dirty="0"/>
+                  <a:t>: dept_no</a:t>
+                </a:r>
+              </a:p>
+            </p:txBody>
+          </p:sp>
+        </p:grpSp>
       </p:grpSp>
       <p:grpSp>
         <p:nvGrpSpPr>
-          <p:cNvPr id="34" name="Group 33">
-            <a:extLst>
-              <a:ext uri="{FF2B5EF4-FFF2-40B4-BE49-F238E27FC236}">
-                <a16:creationId xmlns:a16="http://schemas.microsoft.com/office/drawing/2014/main" id="{B5D85A5D-28A0-463E-AC52-07391CD32F94}"/>
+          <p:cNvPr id="40" name="Group 39">
+            <a:extLst>
+              <a:ext uri="{FF2B5EF4-FFF2-40B4-BE49-F238E27FC236}">
+                <a16:creationId xmlns:a16="http://schemas.microsoft.com/office/drawing/2014/main" id="{12AB3F7D-7653-4672-8FB4-1376B7162423}"/>
               </a:ext>
             </a:extLst>
           </p:cNvPr>
@@ -4048,10 +4035,10 @@
         </p:nvGrpSpPr>
         <p:grpSpPr>
           <a:xfrm>
-            <a:off x="5916103" y="1753419"/>
-            <a:ext cx="2283124" cy="3288339"/>
-            <a:chOff x="3999224" y="3239569"/>
-            <a:chExt cx="1762128" cy="3288339"/>
+            <a:off x="1083304" y="3025835"/>
+            <a:ext cx="2283123" cy="2934632"/>
+            <a:chOff x="4445645" y="389779"/>
+            <a:chExt cx="2283123" cy="2934632"/>
           </a:xfrm>
         </p:grpSpPr>
         <p:sp>
@@ -4068,8 +4055,8 @@
           </p:nvSpPr>
           <p:spPr>
             <a:xfrm>
-              <a:off x="3999224" y="3239569"/>
-              <a:ext cx="1762125" cy="369332"/>
+              <a:off x="4445645" y="389779"/>
+              <a:ext cx="2283120" cy="369332"/>
             </a:xfrm>
             <a:prstGeom prst="rect">
               <a:avLst/>
@@ -4096,17 +4083,17 @@
                     <a:schemeClr val="bg1"/>
                   </a:solidFill>
                 </a:rPr>
-                <a:t>TB5: employees</a:t>
+                <a:t>TB3: employees</a:t>
               </a:r>
             </a:p>
           </p:txBody>
         </p:sp>
         <p:sp>
           <p:nvSpPr>
-            <p:cNvPr id="22" name="TextBox 21">
+            <p:cNvPr id="23" name="TextBox 22">
               <a:extLst>
                 <a:ext uri="{FF2B5EF4-FFF2-40B4-BE49-F238E27FC236}">
-                  <a16:creationId xmlns:a16="http://schemas.microsoft.com/office/drawing/2014/main" id="{0DFAF2BB-BDA1-4346-A0F5-F1F95F515B88}"/>
+                  <a16:creationId xmlns:a16="http://schemas.microsoft.com/office/drawing/2014/main" id="{3C673E48-7DDB-415E-B4BC-11C713697DA3}"/>
                 </a:ext>
               </a:extLst>
             </p:cNvPr>
@@ -4115,8 +4102,8 @@
           </p:nvSpPr>
           <p:spPr>
             <a:xfrm>
-              <a:off x="3999227" y="3618431"/>
-              <a:ext cx="1762125" cy="369332"/>
+              <a:off x="4445648" y="762041"/>
+              <a:ext cx="2283120" cy="369332"/>
             </a:xfrm>
             <a:prstGeom prst="rect">
               <a:avLst/>
@@ -4143,58 +4130,6 @@
               </a:r>
               <a:r>
                 <a:rPr lang="en-US" dirty="0" err="1"/>
-                <a:t>emp_id</a:t>
-              </a:r>
-              <a:endParaRPr lang="en-US" dirty="0"/>
-            </a:p>
-          </p:txBody>
-        </p:sp>
-        <p:sp>
-          <p:nvSpPr>
-            <p:cNvPr id="23" name="TextBox 22">
-              <a:extLst>
-                <a:ext uri="{FF2B5EF4-FFF2-40B4-BE49-F238E27FC236}">
-                  <a16:creationId xmlns:a16="http://schemas.microsoft.com/office/drawing/2014/main" id="{3C673E48-7DDB-415E-B4BC-11C713697DA3}"/>
-                </a:ext>
-              </a:extLst>
-            </p:cNvPr>
-            <p:cNvSpPr txBox="1"/>
-            <p:nvPr/>
-          </p:nvSpPr>
-          <p:spPr>
-            <a:xfrm>
-              <a:off x="3999227" y="3965538"/>
-              <a:ext cx="1762125" cy="369332"/>
-            </a:xfrm>
-            <a:prstGeom prst="rect">
-              <a:avLst/>
-            </a:prstGeom>
-            <a:solidFill>
-              <a:schemeClr val="bg1"/>
-            </a:solidFill>
-            <a:ln>
-              <a:solidFill>
-                <a:schemeClr val="tx1"/>
-              </a:solidFill>
-            </a:ln>
-          </p:spPr>
-          <p:txBody>
-            <a:bodyPr wrap="square" rtlCol="0">
-              <a:spAutoFit/>
-            </a:bodyPr>
-            <a:lstStyle/>
-            <a:p>
-              <a:pPr algn="ctr"/>
-              <a:r>
-                <a:rPr lang="en-US" dirty="0" err="1"/>
-                <a:t>fk</a:t>
-              </a:r>
-              <a:r>
-                <a:rPr lang="en-US" dirty="0"/>
-                <a:t>: </a:t>
-              </a:r>
-              <a:r>
-                <a:rPr lang="en-US" dirty="0" err="1"/>
                 <a:t>emp_no</a:t>
               </a:r>
               <a:endParaRPr lang="en-US" dirty="0"/>
@@ -4215,8 +4150,8 @@
           </p:nvSpPr>
           <p:spPr>
             <a:xfrm>
-              <a:off x="3999226" y="5834057"/>
-              <a:ext cx="1762125" cy="369332"/>
+              <a:off x="4445647" y="2630560"/>
+              <a:ext cx="2283120" cy="369332"/>
             </a:xfrm>
             <a:prstGeom prst="rect">
               <a:avLst/>
@@ -4258,8 +4193,8 @@
           </p:nvSpPr>
           <p:spPr>
             <a:xfrm>
-              <a:off x="3999227" y="4345740"/>
-              <a:ext cx="1762125" cy="369332"/>
+              <a:off x="4445648" y="1142243"/>
+              <a:ext cx="2283120" cy="369332"/>
             </a:xfrm>
             <a:prstGeom prst="rect">
               <a:avLst/>
@@ -4310,8 +4245,8 @@
           </p:nvSpPr>
           <p:spPr>
             <a:xfrm>
-              <a:off x="3999226" y="4714950"/>
-              <a:ext cx="1762125" cy="369332"/>
+              <a:off x="4445647" y="1511453"/>
+              <a:ext cx="2283120" cy="369332"/>
             </a:xfrm>
             <a:prstGeom prst="rect">
               <a:avLst/>
@@ -4354,8 +4289,8 @@
           </p:nvSpPr>
           <p:spPr>
             <a:xfrm>
-              <a:off x="3999226" y="5072927"/>
-              <a:ext cx="1762125" cy="369332"/>
+              <a:off x="4445647" y="1869430"/>
+              <a:ext cx="2283120" cy="369332"/>
             </a:xfrm>
             <a:prstGeom prst="rect">
               <a:avLst/>
@@ -4398,8 +4333,8 @@
           </p:nvSpPr>
           <p:spPr>
             <a:xfrm>
-              <a:off x="3999226" y="5453492"/>
-              <a:ext cx="1762125" cy="369332"/>
+              <a:off x="4445647" y="2249995"/>
+              <a:ext cx="2283120" cy="369332"/>
             </a:xfrm>
             <a:prstGeom prst="rect">
               <a:avLst/>
@@ -4442,8 +4377,8 @@
           </p:nvSpPr>
           <p:spPr>
             <a:xfrm>
-              <a:off x="3999225" y="6158576"/>
-              <a:ext cx="1762125" cy="369332"/>
+              <a:off x="4445645" y="2955079"/>
+              <a:ext cx="2283120" cy="369332"/>
             </a:xfrm>
             <a:prstGeom prst="rect">
               <a:avLst/>
@@ -4475,10 +4410,10 @@
       </p:grpSp>
       <p:grpSp>
         <p:nvGrpSpPr>
-          <p:cNvPr id="35" name="Group 34">
-            <a:extLst>
-              <a:ext uri="{FF2B5EF4-FFF2-40B4-BE49-F238E27FC236}">
-                <a16:creationId xmlns:a16="http://schemas.microsoft.com/office/drawing/2014/main" id="{DE1A2ED3-FD96-4F49-AE96-F942F64E6C50}"/>
+          <p:cNvPr id="25" name="Group 24">
+            <a:extLst>
+              <a:ext uri="{FF2B5EF4-FFF2-40B4-BE49-F238E27FC236}">
+                <a16:creationId xmlns:a16="http://schemas.microsoft.com/office/drawing/2014/main" id="{FB9099D7-AA96-4F09-BF1B-A4C33F38B588}"/>
               </a:ext>
             </a:extLst>
           </p:cNvPr>
@@ -4487,10 +4422,10 @@
         </p:nvGrpSpPr>
         <p:grpSpPr>
           <a:xfrm>
-            <a:off x="5875478" y="5231787"/>
-            <a:ext cx="2364370" cy="1424543"/>
-            <a:chOff x="1276346" y="3429000"/>
-            <a:chExt cx="1762127" cy="1424543"/>
+            <a:off x="4562351" y="4472793"/>
+            <a:ext cx="2364372" cy="1098471"/>
+            <a:chOff x="7189922" y="4610972"/>
+            <a:chExt cx="2364372" cy="1098471"/>
           </a:xfrm>
         </p:grpSpPr>
         <p:sp>
@@ -4507,8 +4442,8 @@
           </p:nvSpPr>
           <p:spPr>
             <a:xfrm>
-              <a:off x="1276348" y="3429000"/>
-              <a:ext cx="1762125" cy="369332"/>
+              <a:off x="7189922" y="4610972"/>
+              <a:ext cx="2364367" cy="369332"/>
             </a:xfrm>
             <a:prstGeom prst="rect">
               <a:avLst/>
@@ -4540,219 +4475,146 @@
             </a:p>
           </p:txBody>
         </p:sp>
-        <p:sp>
-          <p:nvSpPr>
-            <p:cNvPr id="37" name="TextBox 36">
+        <p:grpSp>
+          <p:nvGrpSpPr>
+            <p:cNvPr id="24" name="Group 23">
               <a:extLst>
                 <a:ext uri="{FF2B5EF4-FFF2-40B4-BE49-F238E27FC236}">
-                  <a16:creationId xmlns:a16="http://schemas.microsoft.com/office/drawing/2014/main" id="{71F8BA8B-CA04-4EA6-A5B2-51FB9654071D}"/>
+                  <a16:creationId xmlns:a16="http://schemas.microsoft.com/office/drawing/2014/main" id="{C15A6AA8-329B-429B-8914-29F2977F3E1A}"/>
                 </a:ext>
               </a:extLst>
             </p:cNvPr>
-            <p:cNvSpPr txBox="1"/>
+            <p:cNvGrpSpPr/>
             <p:nvPr/>
-          </p:nvSpPr>
-          <p:spPr>
+          </p:nvGrpSpPr>
+          <p:grpSpPr>
             <a:xfrm>
-              <a:off x="1276346" y="4484211"/>
-              <a:ext cx="1762125" cy="369332"/>
+              <a:off x="7189923" y="4970779"/>
+              <a:ext cx="2364371" cy="738664"/>
+              <a:chOff x="7189923" y="4970779"/>
+              <a:chExt cx="2364371" cy="738664"/>
             </a:xfrm>
-            <a:prstGeom prst="rect">
-              <a:avLst/>
-            </a:prstGeom>
-            <a:solidFill>
-              <a:schemeClr val="bg1"/>
-            </a:solidFill>
-            <a:ln>
+          </p:grpSpPr>
+          <p:sp>
+            <p:nvSpPr>
+              <p:cNvPr id="37" name="TextBox 36">
+                <a:extLst>
+                  <a:ext uri="{FF2B5EF4-FFF2-40B4-BE49-F238E27FC236}">
+                    <a16:creationId xmlns:a16="http://schemas.microsoft.com/office/drawing/2014/main" id="{71F8BA8B-CA04-4EA6-A5B2-51FB9654071D}"/>
+                  </a:ext>
+                </a:extLst>
+              </p:cNvPr>
+              <p:cNvSpPr txBox="1"/>
+              <p:nvPr/>
+            </p:nvSpPr>
+            <p:spPr>
+              <a:xfrm>
+                <a:off x="7189923" y="5340111"/>
+                <a:ext cx="2364367" cy="369332"/>
+              </a:xfrm>
+              <a:prstGeom prst="rect">
+                <a:avLst/>
+              </a:prstGeom>
               <a:solidFill>
-                <a:schemeClr val="tx1"/>
+                <a:schemeClr val="bg1"/>
               </a:solidFill>
-            </a:ln>
-          </p:spPr>
-          <p:txBody>
-            <a:bodyPr wrap="square" rtlCol="0">
-              <a:spAutoFit/>
-            </a:bodyPr>
-            <a:lstStyle/>
-            <a:p>
-              <a:pPr algn="ctr"/>
-              <a:r>
-                <a:rPr lang="en-US" dirty="0"/>
-                <a:t>salary</a:t>
-              </a:r>
-            </a:p>
-          </p:txBody>
-        </p:sp>
-        <p:sp>
-          <p:nvSpPr>
-            <p:cNvPr id="38" name="TextBox 37">
-              <a:extLst>
-                <a:ext uri="{FF2B5EF4-FFF2-40B4-BE49-F238E27FC236}">
-                  <a16:creationId xmlns:a16="http://schemas.microsoft.com/office/drawing/2014/main" id="{CADD7F78-7446-47FE-B737-6719801BF37B}"/>
-                </a:ext>
-              </a:extLst>
-            </p:cNvPr>
-            <p:cNvSpPr txBox="1"/>
-            <p:nvPr/>
-          </p:nvSpPr>
-          <p:spPr>
-            <a:xfrm>
-              <a:off x="1276347" y="4123214"/>
-              <a:ext cx="1762125" cy="369332"/>
-            </a:xfrm>
-            <a:prstGeom prst="rect">
-              <a:avLst/>
-            </a:prstGeom>
-            <a:solidFill>
-              <a:schemeClr val="bg1"/>
-            </a:solidFill>
-            <a:ln>
+              <a:ln>
+                <a:solidFill>
+                  <a:schemeClr val="tx1"/>
+                </a:solidFill>
+              </a:ln>
+            </p:spPr>
+            <p:txBody>
+              <a:bodyPr wrap="square" rtlCol="0">
+                <a:spAutoFit/>
+              </a:bodyPr>
+              <a:lstStyle/>
+              <a:p>
+                <a:pPr algn="ctr"/>
+                <a:r>
+                  <a:rPr lang="en-US" dirty="0"/>
+                  <a:t>salary</a:t>
+                </a:r>
+              </a:p>
+            </p:txBody>
+          </p:sp>
+          <p:sp>
+            <p:nvSpPr>
+              <p:cNvPr id="38" name="TextBox 37">
+                <a:extLst>
+                  <a:ext uri="{FF2B5EF4-FFF2-40B4-BE49-F238E27FC236}">
+                    <a16:creationId xmlns:a16="http://schemas.microsoft.com/office/drawing/2014/main" id="{CADD7F78-7446-47FE-B737-6719801BF37B}"/>
+                  </a:ext>
+                </a:extLst>
+              </p:cNvPr>
+              <p:cNvSpPr txBox="1"/>
+              <p:nvPr/>
+            </p:nvSpPr>
+            <p:spPr>
+              <a:xfrm>
+                <a:off x="7189927" y="4970779"/>
+                <a:ext cx="2364367" cy="369332"/>
+              </a:xfrm>
+              <a:prstGeom prst="rect">
+                <a:avLst/>
+              </a:prstGeom>
               <a:solidFill>
-                <a:schemeClr val="tx1"/>
+                <a:schemeClr val="bg1"/>
               </a:solidFill>
-            </a:ln>
-          </p:spPr>
-          <p:txBody>
-            <a:bodyPr wrap="square" rtlCol="0">
-              <a:spAutoFit/>
-            </a:bodyPr>
-            <a:lstStyle/>
-            <a:p>
-              <a:pPr algn="ctr"/>
-              <a:r>
-                <a:rPr lang="en-US" dirty="0" err="1"/>
-                <a:t>fk</a:t>
-              </a:r>
-              <a:r>
-                <a:rPr lang="en-US" dirty="0"/>
-                <a:t>: </a:t>
-              </a:r>
-              <a:r>
-                <a:rPr lang="en-US" dirty="0" err="1"/>
-                <a:t>emp_no</a:t>
-              </a:r>
-              <a:endParaRPr lang="en-US" dirty="0"/>
-            </a:p>
-          </p:txBody>
-        </p:sp>
-        <p:sp>
-          <p:nvSpPr>
-            <p:cNvPr id="39" name="TextBox 38">
-              <a:extLst>
-                <a:ext uri="{FF2B5EF4-FFF2-40B4-BE49-F238E27FC236}">
-                  <a16:creationId xmlns:a16="http://schemas.microsoft.com/office/drawing/2014/main" id="{0F5E8A67-F115-4D75-829A-12FCC7F77C05}"/>
-                </a:ext>
-              </a:extLst>
-            </p:cNvPr>
-            <p:cNvSpPr txBox="1"/>
-            <p:nvPr/>
-          </p:nvSpPr>
-          <p:spPr>
-            <a:xfrm>
-              <a:off x="1276346" y="3798332"/>
-              <a:ext cx="1762125" cy="369332"/>
-            </a:xfrm>
-            <a:prstGeom prst="rect">
-              <a:avLst/>
-            </a:prstGeom>
-            <a:solidFill>
-              <a:schemeClr val="bg1"/>
-            </a:solidFill>
-            <a:ln>
-              <a:solidFill>
-                <a:schemeClr val="tx1"/>
-              </a:solidFill>
-            </a:ln>
-          </p:spPr>
-          <p:txBody>
-            <a:bodyPr wrap="square" rtlCol="0">
-              <a:spAutoFit/>
-            </a:bodyPr>
-            <a:lstStyle/>
-            <a:p>
-              <a:pPr algn="ctr"/>
-              <a:r>
-                <a:rPr lang="en-US" dirty="0"/>
-                <a:t>pk: </a:t>
-              </a:r>
-              <a:r>
-                <a:rPr lang="en-US" dirty="0" err="1"/>
-                <a:t>sal_id</a:t>
-              </a:r>
-              <a:endParaRPr lang="en-US" dirty="0"/>
-            </a:p>
-          </p:txBody>
-        </p:sp>
+              <a:ln>
+                <a:solidFill>
+                  <a:schemeClr val="tx1"/>
+                </a:solidFill>
+              </a:ln>
+            </p:spPr>
+            <p:txBody>
+              <a:bodyPr wrap="square" rtlCol="0">
+                <a:spAutoFit/>
+              </a:bodyPr>
+              <a:lstStyle/>
+              <a:p>
+                <a:pPr algn="ctr"/>
+                <a:r>
+                  <a:rPr lang="en-US" dirty="0" err="1"/>
+                  <a:t>fk</a:t>
+                </a:r>
+                <a:r>
+                  <a:rPr lang="en-US" dirty="0"/>
+                  <a:t>: </a:t>
+                </a:r>
+                <a:r>
+                  <a:rPr lang="en-US" dirty="0" err="1"/>
+                  <a:t>emp_no</a:t>
+                </a:r>
+                <a:endParaRPr lang="en-US" dirty="0"/>
+              </a:p>
+            </p:txBody>
+          </p:sp>
+        </p:grpSp>
       </p:grpSp>
       <p:cxnSp>
         <p:nvCxnSpPr>
-          <p:cNvPr id="44" name="Connector: Elbow 43">
-            <a:extLst>
-              <a:ext uri="{FF2B5EF4-FFF2-40B4-BE49-F238E27FC236}">
-                <a16:creationId xmlns:a16="http://schemas.microsoft.com/office/drawing/2014/main" id="{3C3E420F-DDE8-4F13-AF28-8EE15D12B8E7}"/>
+          <p:cNvPr id="47" name="Connector: Elbow 46">
+            <a:extLst>
+              <a:ext uri="{FF2B5EF4-FFF2-40B4-BE49-F238E27FC236}">
+                <a16:creationId xmlns:a16="http://schemas.microsoft.com/office/drawing/2014/main" id="{F92E5541-C6BE-4139-86BC-8D9CBFEE1864}"/>
               </a:ext>
             </a:extLst>
           </p:cNvPr>
           <p:cNvCxnSpPr>
-            <a:cxnSpLocks/>
-            <a:stCxn id="5" idx="1"/>
-            <a:endCxn id="11" idx="1"/>
+            <a:stCxn id="18" idx="1"/>
+            <a:endCxn id="29" idx="1"/>
           </p:cNvCxnSpPr>
           <p:nvPr/>
         </p:nvCxnSpPr>
         <p:spPr>
           <a:xfrm rot="10800000" flipH="1" flipV="1">
-            <a:off x="1083303" y="1322314"/>
-            <a:ext cx="1" cy="3968660"/>
+            <a:off x="1083303" y="2189041"/>
+            <a:ext cx="3" cy="1773924"/>
           </a:xfrm>
           <a:prstGeom prst="bentConnector3">
             <a:avLst>
-              <a:gd name="adj1" fmla="val -22860000000"/>
-            </a:avLst>
-          </a:prstGeom>
-          <a:ln>
-            <a:headEnd type="triangle"/>
-            <a:tailEnd type="triangle"/>
-          </a:ln>
-        </p:spPr>
-        <p:style>
-          <a:lnRef idx="1">
-            <a:schemeClr val="accent1"/>
-          </a:lnRef>
-          <a:fillRef idx="0">
-            <a:schemeClr val="accent1"/>
-          </a:fillRef>
-          <a:effectRef idx="0">
-            <a:schemeClr val="accent1"/>
-          </a:effectRef>
-          <a:fontRef idx="minor">
-            <a:schemeClr val="tx1"/>
-          </a:fontRef>
-        </p:style>
-      </p:cxnSp>
-      <p:cxnSp>
-        <p:nvCxnSpPr>
-          <p:cNvPr id="48" name="Connector: Elbow 47">
-            <a:extLst>
-              <a:ext uri="{FF2B5EF4-FFF2-40B4-BE49-F238E27FC236}">
-                <a16:creationId xmlns:a16="http://schemas.microsoft.com/office/drawing/2014/main" id="{0638F702-4AE0-4FC1-B694-8DD6954605C9}"/>
-              </a:ext>
-            </a:extLst>
-          </p:cNvPr>
-          <p:cNvCxnSpPr>
-            <a:stCxn id="5" idx="3"/>
-            <a:endCxn id="15" idx="3"/>
-          </p:cNvCxnSpPr>
-          <p:nvPr/>
-        </p:nvCxnSpPr>
-        <p:spPr>
-          <a:xfrm flipH="1">
-            <a:off x="3261320" y="1322314"/>
-            <a:ext cx="18" cy="2001474"/>
-          </a:xfrm>
-          <a:prstGeom prst="bentConnector3">
-            <a:avLst>
-              <a:gd name="adj1" fmla="val -1270000000"/>
+              <a:gd name="adj1" fmla="val -7620000000"/>
             </a:avLst>
           </a:prstGeom>
           <a:ln>
@@ -4776,67 +4638,23 @@
       </p:cxnSp>
       <p:cxnSp>
         <p:nvCxnSpPr>
-          <p:cNvPr id="50" name="Connector: Elbow 49">
-            <a:extLst>
-              <a:ext uri="{FF2B5EF4-FFF2-40B4-BE49-F238E27FC236}">
-                <a16:creationId xmlns:a16="http://schemas.microsoft.com/office/drawing/2014/main" id="{B208A739-E54D-4CC4-8B5B-B6FCEE78DC39}"/>
+          <p:cNvPr id="61" name="Connector: Elbow 60">
+            <a:extLst>
+              <a:ext uri="{FF2B5EF4-FFF2-40B4-BE49-F238E27FC236}">
+                <a16:creationId xmlns:a16="http://schemas.microsoft.com/office/drawing/2014/main" id="{44582CA1-12E6-4549-9E21-7BC0D925388C}"/>
               </a:ext>
             </a:extLst>
           </p:cNvPr>
           <p:cNvCxnSpPr>
-            <a:stCxn id="10" idx="3"/>
-            <a:endCxn id="14" idx="3"/>
+            <a:stCxn id="23" idx="3"/>
+            <a:endCxn id="38" idx="1"/>
           </p:cNvCxnSpPr>
           <p:nvPr/>
         </p:nvCxnSpPr>
         <p:spPr>
-          <a:xfrm flipV="1">
-            <a:off x="3261316" y="3684785"/>
-            <a:ext cx="3" cy="1259082"/>
-          </a:xfrm>
-          <a:prstGeom prst="bentConnector3">
-            <a:avLst>
-              <a:gd name="adj1" fmla="val 7620100000"/>
-            </a:avLst>
-          </a:prstGeom>
-          <a:ln>
-            <a:tailEnd type="triangle"/>
-          </a:ln>
-        </p:spPr>
-        <p:style>
-          <a:lnRef idx="1">
-            <a:schemeClr val="accent1"/>
-          </a:lnRef>
-          <a:fillRef idx="0">
-            <a:schemeClr val="accent1"/>
-          </a:fillRef>
-          <a:effectRef idx="0">
-            <a:schemeClr val="accent1"/>
-          </a:effectRef>
-          <a:fontRef idx="minor">
-            <a:schemeClr val="tx1"/>
-          </a:fontRef>
-        </p:style>
-      </p:cxnSp>
-      <p:cxnSp>
-        <p:nvCxnSpPr>
-          <p:cNvPr id="52" name="Connector: Elbow 51">
-            <a:extLst>
-              <a:ext uri="{FF2B5EF4-FFF2-40B4-BE49-F238E27FC236}">
-                <a16:creationId xmlns:a16="http://schemas.microsoft.com/office/drawing/2014/main" id="{DE5D859F-3B6E-459A-8E97-9A2611F74079}"/>
-              </a:ext>
-            </a:extLst>
-          </p:cNvPr>
-          <p:cNvCxnSpPr>
-            <a:stCxn id="10" idx="3"/>
-            <a:endCxn id="23" idx="1"/>
-          </p:cNvCxnSpPr>
-          <p:nvPr/>
-        </p:nvCxnSpPr>
-        <p:spPr>
-          <a:xfrm flipV="1">
-            <a:off x="3261316" y="2664054"/>
-            <a:ext cx="2654791" cy="2279813"/>
+          <a:xfrm>
+            <a:off x="3366427" y="3582763"/>
+            <a:ext cx="1195929" cy="1434503"/>
           </a:xfrm>
           <a:prstGeom prst="bentConnector3">
             <a:avLst/>
@@ -4862,27 +4680,111 @@
       </p:cxnSp>
       <p:cxnSp>
         <p:nvCxnSpPr>
-          <p:cNvPr id="54" name="Connector: Elbow 53">
-            <a:extLst>
-              <a:ext uri="{FF2B5EF4-FFF2-40B4-BE49-F238E27FC236}">
-                <a16:creationId xmlns:a16="http://schemas.microsoft.com/office/drawing/2014/main" id="{F8A798CD-40F3-4E6B-913F-4AAC1424CB5E}"/>
+          <p:cNvPr id="63" name="Connector: Elbow 62">
+            <a:extLst>
+              <a:ext uri="{FF2B5EF4-FFF2-40B4-BE49-F238E27FC236}">
+                <a16:creationId xmlns:a16="http://schemas.microsoft.com/office/drawing/2014/main" id="{94798AFA-3191-4E14-BA0A-8F7E6810AC06}"/>
               </a:ext>
             </a:extLst>
           </p:cNvPr>
           <p:cNvCxnSpPr>
-            <a:stCxn id="18" idx="3"/>
-            <a:endCxn id="29" idx="3"/>
+            <a:stCxn id="23" idx="3"/>
+            <a:endCxn id="10" idx="1"/>
           </p:cNvCxnSpPr>
           <p:nvPr/>
         </p:nvCxnSpPr>
         <p:spPr>
-          <a:xfrm flipH="1">
-            <a:off x="8199227" y="905099"/>
-            <a:ext cx="10051" cy="2139157"/>
+          <a:xfrm flipV="1">
+            <a:off x="3366427" y="2189041"/>
+            <a:ext cx="1195924" cy="1393722"/>
+          </a:xfrm>
+          <a:prstGeom prst="bentConnector3">
+            <a:avLst/>
+          </a:prstGeom>
+          <a:ln>
+            <a:tailEnd type="triangle"/>
+          </a:ln>
+        </p:spPr>
+        <p:style>
+          <a:lnRef idx="1">
+            <a:schemeClr val="accent1"/>
+          </a:lnRef>
+          <a:fillRef idx="0">
+            <a:schemeClr val="accent1"/>
+          </a:fillRef>
+          <a:effectRef idx="0">
+            <a:schemeClr val="accent1"/>
+          </a:effectRef>
+          <a:fontRef idx="minor">
+            <a:schemeClr val="tx1"/>
+          </a:fontRef>
+        </p:style>
+      </p:cxnSp>
+      <p:cxnSp>
+        <p:nvCxnSpPr>
+          <p:cNvPr id="67" name="Connector: Elbow 66">
+            <a:extLst>
+              <a:ext uri="{FF2B5EF4-FFF2-40B4-BE49-F238E27FC236}">
+                <a16:creationId xmlns:a16="http://schemas.microsoft.com/office/drawing/2014/main" id="{265EE821-8700-4076-B189-F432662B44EF}"/>
+              </a:ext>
+            </a:extLst>
+          </p:cNvPr>
+          <p:cNvCxnSpPr>
+            <a:stCxn id="23" idx="3"/>
+            <a:endCxn id="14" idx="2"/>
+          </p:cNvCxnSpPr>
+          <p:nvPr/>
+        </p:nvCxnSpPr>
+        <p:spPr>
+          <a:xfrm flipV="1">
+            <a:off x="3366427" y="2720814"/>
+            <a:ext cx="5257062" cy="861949"/>
+          </a:xfrm>
+          <a:prstGeom prst="bentConnector2">
+            <a:avLst/>
+          </a:prstGeom>
+          <a:ln>
+            <a:tailEnd type="triangle"/>
+          </a:ln>
+        </p:spPr>
+        <p:style>
+          <a:lnRef idx="1">
+            <a:schemeClr val="accent1"/>
+          </a:lnRef>
+          <a:fillRef idx="0">
+            <a:schemeClr val="accent1"/>
+          </a:fillRef>
+          <a:effectRef idx="0">
+            <a:schemeClr val="accent1"/>
+          </a:effectRef>
+          <a:fontRef idx="minor">
+            <a:schemeClr val="tx1"/>
+          </a:fontRef>
+        </p:style>
+      </p:cxnSp>
+      <p:cxnSp>
+        <p:nvCxnSpPr>
+          <p:cNvPr id="69" name="Connector: Elbow 68">
+            <a:extLst>
+              <a:ext uri="{FF2B5EF4-FFF2-40B4-BE49-F238E27FC236}">
+                <a16:creationId xmlns:a16="http://schemas.microsoft.com/office/drawing/2014/main" id="{8AF45BB1-AEC8-4505-9442-6907E20B8DBB}"/>
+              </a:ext>
+            </a:extLst>
+          </p:cNvPr>
+          <p:cNvCxnSpPr>
+            <a:stCxn id="5" idx="3"/>
+            <a:endCxn id="11" idx="3"/>
+          </p:cNvCxnSpPr>
+          <p:nvPr/>
+        </p:nvCxnSpPr>
+        <p:spPr>
+          <a:xfrm>
+            <a:off x="3366423" y="791410"/>
+            <a:ext cx="3479047" cy="1744738"/>
           </a:xfrm>
           <a:prstGeom prst="bentConnector3">
             <a:avLst>
-              <a:gd name="adj1" fmla="val -2274401"/>
+              <a:gd name="adj1" fmla="val 106571"/>
             </a:avLst>
           </a:prstGeom>
           <a:ln>
@@ -4906,26 +4808,28 @@
       </p:cxnSp>
       <p:cxnSp>
         <p:nvCxnSpPr>
-          <p:cNvPr id="56" name="Connector: Elbow 55">
-            <a:extLst>
-              <a:ext uri="{FF2B5EF4-FFF2-40B4-BE49-F238E27FC236}">
-                <a16:creationId xmlns:a16="http://schemas.microsoft.com/office/drawing/2014/main" id="{6E8F5205-A35D-42BB-9EB4-7957F37F80C0}"/>
+          <p:cNvPr id="71" name="Connector: Elbow 70">
+            <a:extLst>
+              <a:ext uri="{FF2B5EF4-FFF2-40B4-BE49-F238E27FC236}">
+                <a16:creationId xmlns:a16="http://schemas.microsoft.com/office/drawing/2014/main" id="{1E167412-75A8-42DA-81C2-198B80D6AF96}"/>
               </a:ext>
             </a:extLst>
           </p:cNvPr>
           <p:cNvCxnSpPr>
-            <a:stCxn id="10" idx="3"/>
-            <a:endCxn id="38" idx="1"/>
+            <a:stCxn id="5" idx="3"/>
+            <a:endCxn id="15" idx="3"/>
           </p:cNvCxnSpPr>
           <p:nvPr/>
         </p:nvCxnSpPr>
         <p:spPr>
           <a:xfrm>
-            <a:off x="3261316" y="4943867"/>
-            <a:ext cx="2614163" cy="1166800"/>
+            <a:off x="3366423" y="791410"/>
+            <a:ext cx="6346072" cy="1419734"/>
           </a:xfrm>
           <a:prstGeom prst="bentConnector3">
-            <a:avLst/>
+            <a:avLst>
+              <a:gd name="adj1" fmla="val 103602"/>
+            </a:avLst>
           </a:prstGeom>
           <a:ln>
             <a:tailEnd type="triangle"/>

</xml_diff>